<commit_message>
add count-2pair.pptx, tweak genprod.pptx, reconcile FP_stable_matching_unequal_invariants in fall15 and problems and delete fall15 copy
</commit_message>
<xml_diff>
--- a/fall15/slidesF15/genprod.pptx
+++ b/fall15/slidesF15/genprod.pptx
@@ -2574,6 +2574,30 @@
           </a:p>
         </p:txBody>
       </p:sp>
+      <p:pic>
+        <p:nvPicPr>
+          <p:cNvPr id="7" name="Picture 6"/>
+          <p:cNvPicPr>
+            <a:picLocks noChangeAspect="1"/>
+          </p:cNvPicPr>
+          <p:nvPr userDrawn="1"/>
+        </p:nvPicPr>
+        <p:blipFill>
+          <a:blip r:embed="rId7"/>
+          <a:stretch>
+            <a:fillRect/>
+          </a:stretch>
+        </p:blipFill>
+        <p:spPr>
+          <a:xfrm>
+            <a:off x="0" y="6500091"/>
+            <a:ext cx="1016000" cy="357909"/>
+          </a:xfrm>
+          <a:prstGeom prst="rect">
+            <a:avLst/>
+          </a:prstGeom>
+        </p:spPr>
+      </p:pic>
     </p:spTree>
   </p:cSld>
   <p:clrMap bg1="lt1" tx1="dk1" bg2="lt2" tx2="dk2" accent1="accent1" accent2="accent2" accent3="accent3" accent4="accent4" accent5="accent5" accent6="accent6" hlink="hlink" folHlink="folHlink"/>
@@ -3288,7 +3312,7 @@
           <a:graphicData uri="http://schemas.openxmlformats.org/presentationml/2006/ole">
             <mc:AlternateContent xmlns:mc="http://schemas.openxmlformats.org/markup-compatibility/2006">
               <mc:Choice xmlns:v="urn:schemas-microsoft-com:vml" Requires="v">
-                <p:oleObj spid="_x0000_s8257" name="Equation" r:id="rId4" imgW="914400" imgH="198720" progId="Equation.DSMT4">
+                <p:oleObj spid="_x0000_s8261" name="Equation" r:id="rId4" imgW="914400" imgH="198720" progId="Equation.DSMT4">
                   <p:embed/>
                 </p:oleObj>
               </mc:Choice>
@@ -3444,7 +3468,7 @@
           <a:graphicData uri="http://schemas.openxmlformats.org/presentationml/2006/ole">
             <mc:AlternateContent xmlns:mc="http://schemas.openxmlformats.org/markup-compatibility/2006">
               <mc:Choice xmlns:v="urn:schemas-microsoft-com:vml" Requires="v">
-                <p:oleObj spid="_x0000_s8258" name="Equation" r:id="rId6" imgW="1180800" imgH="507960" progId="Equation.DSMT4">
+                <p:oleObj spid="_x0000_s8262" name="Equation" r:id="rId6" imgW="1180800" imgH="507960" progId="Equation.DSMT4">
                   <p:embed/>
                 </p:oleObj>
               </mc:Choice>
@@ -3557,7 +3581,7 @@
           <a:graphicData uri="http://schemas.openxmlformats.org/presentationml/2006/ole">
             <mc:AlternateContent xmlns:mc="http://schemas.openxmlformats.org/markup-compatibility/2006">
               <mc:Choice xmlns:v="urn:schemas-microsoft-com:vml" Requires="v">
-                <p:oleObj spid="_x0000_s8259" name="Equation" r:id="rId8" imgW="469900" imgH="431800" progId="Equation.DSMT4">
+                <p:oleObj spid="_x0000_s8263" name="Equation" r:id="rId8" imgW="469900" imgH="431800" progId="Equation.DSMT4">
                   <p:embed/>
                 </p:oleObj>
               </mc:Choice>
@@ -4372,9 +4396,6 @@
               </a:rPr>
               <a:t>student can’t be in 2 places:</a:t>
             </a:r>
-            <a:endParaRPr lang="en-US" sz="4400" dirty="0" smtClean="0">
-              <a:latin typeface="Comic Sans MS" pitchFamily="66" charset="0"/>
-            </a:endParaRPr>
           </a:p>
           <a:p>
             <a:pPr marL="342900" indent="-342900"/>
@@ -5405,7 +5426,7 @@
           <a:graphicData uri="http://schemas.openxmlformats.org/presentationml/2006/ole">
             <mc:AlternateContent xmlns:mc="http://schemas.openxmlformats.org/markup-compatibility/2006">
               <mc:Choice xmlns:v="urn:schemas-microsoft-com:vml" Requires="v">
-                <p:oleObj spid="_x0000_s1056" name="Equation" r:id="rId4" imgW="406400" imgH="419100" progId="Equation.DSMT4">
+                <p:oleObj spid="_x0000_s1058" name="Equation" r:id="rId4" imgW="406400" imgH="419100" progId="Equation.DSMT4">
                   <p:embed/>
                 </p:oleObj>
               </mc:Choice>
@@ -7189,7 +7210,7 @@
           <a:graphicData uri="http://schemas.openxmlformats.org/presentationml/2006/ole">
             <mc:AlternateContent xmlns:mc="http://schemas.openxmlformats.org/markup-compatibility/2006">
               <mc:Choice xmlns:v="urn:schemas-microsoft-com:vml" Requires="v">
-                <p:oleObj spid="_x0000_s2102" name="Equation" r:id="rId4" imgW="914400" imgH="198720" progId="Equation.DSMT4">
+                <p:oleObj spid="_x0000_s2105" name="Equation" r:id="rId4" imgW="914400" imgH="198720" progId="Equation.DSMT4">
                   <p:embed/>
                 </p:oleObj>
               </mc:Choice>
@@ -7259,7 +7280,7 @@
           <a:graphicData uri="http://schemas.openxmlformats.org/presentationml/2006/ole">
             <mc:AlternateContent xmlns:mc="http://schemas.openxmlformats.org/markup-compatibility/2006">
               <mc:Choice xmlns:v="urn:schemas-microsoft-com:vml" Requires="v">
-                <p:oleObj spid="_x0000_s2103" name="Equation" r:id="rId6" imgW="1854000" imgH="406080" progId="Equation.DSMT4">
+                <p:oleObj spid="_x0000_s2106" name="Equation" r:id="rId6" imgW="1854000" imgH="406080" progId="Equation.DSMT4">
                   <p:embed/>
                 </p:oleObj>
               </mc:Choice>
@@ -7638,17 +7659,7 @@
                   </a:schemeClr>
                 </a:solidFill>
               </a:rPr>
-              <a:t>|B</a:t>
-            </a:r>
-            <a:r>
-              <a:rPr lang="en-US" sz="7200" dirty="0" smtClean="0">
-                <a:solidFill>
-                  <a:schemeClr val="accent1">
-                    <a:lumMod val="50000"/>
-                  </a:schemeClr>
-                </a:solidFill>
-              </a:rPr>
-              <a:t>|</a:t>
+              <a:t>|B|</a:t>
             </a:r>
           </a:p>
           <a:p>
@@ -7678,7 +7689,7 @@
           <a:graphicData uri="http://schemas.openxmlformats.org/presentationml/2006/ole">
             <mc:AlternateContent xmlns:mc="http://schemas.openxmlformats.org/markup-compatibility/2006">
               <mc:Choice xmlns:v="urn:schemas-microsoft-com:vml" Requires="v">
-                <p:oleObj spid="_x0000_s3105" name="Equation" r:id="rId4" imgW="914400" imgH="198720" progId="Equation.DSMT4">
+                <p:oleObj spid="_x0000_s3107" name="Equation" r:id="rId4" imgW="914400" imgH="198720" progId="Equation.DSMT4">
                   <p:embed/>
                 </p:oleObj>
               </mc:Choice>
@@ -8026,7 +8037,7 @@
           <a:graphicData uri="http://schemas.openxmlformats.org/presentationml/2006/ole">
             <mc:AlternateContent xmlns:mc="http://schemas.openxmlformats.org/markup-compatibility/2006">
               <mc:Choice xmlns:v="urn:schemas-microsoft-com:vml" Requires="v">
-                <p:oleObj spid="_x0000_s4129" name="Equation" r:id="rId4" imgW="914400" imgH="198720" progId="Equation.DSMT4">
+                <p:oleObj spid="_x0000_s4131" name="Equation" r:id="rId4" imgW="914400" imgH="198720" progId="Equation.DSMT4">
                   <p:embed/>
                 </p:oleObj>
               </mc:Choice>
@@ -8970,7 +8981,7 @@
           <a:graphicData uri="http://schemas.openxmlformats.org/presentationml/2006/ole">
             <mc:AlternateContent xmlns:mc="http://schemas.openxmlformats.org/markup-compatibility/2006">
               <mc:Choice xmlns:v="urn:schemas-microsoft-com:vml" Requires="v">
-                <p:oleObj spid="_x0000_s5152" name="Equation" r:id="rId4" imgW="914400" imgH="198720" progId="Equation.DSMT4">
+                <p:oleObj spid="_x0000_s5154" name="Equation" r:id="rId4" imgW="914400" imgH="198720" progId="Equation.DSMT4">
                   <p:embed/>
                 </p:oleObj>
               </mc:Choice>
@@ -10432,7 +10443,7 @@
           <a:graphicData uri="http://schemas.openxmlformats.org/presentationml/2006/ole">
             <mc:AlternateContent xmlns:mc="http://schemas.openxmlformats.org/markup-compatibility/2006">
               <mc:Choice xmlns:v="urn:schemas-microsoft-com:vml" Requires="v">
-                <p:oleObj spid="_x0000_s7244" name="Equation" r:id="rId4" imgW="914400" imgH="198720" progId="Equation.DSMT4">
+                <p:oleObj spid="_x0000_s7248" name="Equation" r:id="rId4" imgW="914400" imgH="198720" progId="Equation.DSMT4">
                   <p:embed/>
                 </p:oleObj>
               </mc:Choice>
@@ -10568,7 +10579,7 @@
           <a:graphicData uri="http://schemas.openxmlformats.org/presentationml/2006/ole">
             <mc:AlternateContent xmlns:mc="http://schemas.openxmlformats.org/markup-compatibility/2006">
               <mc:Choice xmlns:v="urn:schemas-microsoft-com:vml" Requires="v">
-                <p:oleObj spid="_x0000_s7245" name="Equation" r:id="rId6" imgW="330200" imgH="419100" progId="Equation.DSMT4">
+                <p:oleObj spid="_x0000_s7249" name="Equation" r:id="rId6" imgW="330200" imgH="419100" progId="Equation.DSMT4">
                   <p:embed/>
                 </p:oleObj>
               </mc:Choice>
@@ -10624,7 +10635,7 @@
           <a:graphicData uri="http://schemas.openxmlformats.org/presentationml/2006/ole">
             <mc:AlternateContent xmlns:mc="http://schemas.openxmlformats.org/markup-compatibility/2006">
               <mc:Choice xmlns:v="urn:schemas-microsoft-com:vml" Requires="v">
-                <p:oleObj spid="_x0000_s7246" name="Equation" r:id="rId8" imgW="571320" imgH="457200" progId="Equation.DSMT4">
+                <p:oleObj spid="_x0000_s7250" name="Equation" r:id="rId8" imgW="571320" imgH="457200" progId="Equation.DSMT4">
                   <p:embed/>
                 </p:oleObj>
               </mc:Choice>

</xml_diff>

<commit_message>
edit proofs1.pptx genprod.pptx count-2pair.pptx
</commit_message>
<xml_diff>
--- a/fall15/slidesF15/genprod.pptx
+++ b/fall15/slidesF15/genprod.pptx
@@ -3312,7 +3312,7 @@
           <a:graphicData uri="http://schemas.openxmlformats.org/presentationml/2006/ole">
             <mc:AlternateContent xmlns:mc="http://schemas.openxmlformats.org/markup-compatibility/2006">
               <mc:Choice xmlns:v="urn:schemas-microsoft-com:vml" Requires="v">
-                <p:oleObj spid="_x0000_s8261" name="Equation" r:id="rId4" imgW="914400" imgH="198720" progId="Equation.DSMT4">
+                <p:oleObj spid="_x0000_s8272" name="Equation" r:id="rId4" imgW="914400" imgH="198720" progId="Equation.DSMT4">
                   <p:embed/>
                 </p:oleObj>
               </mc:Choice>
@@ -3468,7 +3468,7 @@
           <a:graphicData uri="http://schemas.openxmlformats.org/presentationml/2006/ole">
             <mc:AlternateContent xmlns:mc="http://schemas.openxmlformats.org/markup-compatibility/2006">
               <mc:Choice xmlns:v="urn:schemas-microsoft-com:vml" Requires="v">
-                <p:oleObj spid="_x0000_s8262" name="Equation" r:id="rId6" imgW="1180800" imgH="507960" progId="Equation.DSMT4">
+                <p:oleObj spid="_x0000_s8273" name="Equation" r:id="rId6" imgW="1180800" imgH="507960" progId="Equation.DSMT4">
                   <p:embed/>
                 </p:oleObj>
               </mc:Choice>
@@ -3581,7 +3581,7 @@
           <a:graphicData uri="http://schemas.openxmlformats.org/presentationml/2006/ole">
             <mc:AlternateContent xmlns:mc="http://schemas.openxmlformats.org/markup-compatibility/2006">
               <mc:Choice xmlns:v="urn:schemas-microsoft-com:vml" Requires="v">
-                <p:oleObj spid="_x0000_s8263" name="Equation" r:id="rId8" imgW="469900" imgH="431800" progId="Equation.DSMT4">
+                <p:oleObj spid="_x0000_s8274" name="Equation" r:id="rId8" imgW="469900" imgH="431800" progId="Equation.DSMT4">
                   <p:embed/>
                 </p:oleObj>
               </mc:Choice>
@@ -5426,7 +5426,7 @@
           <a:graphicData uri="http://schemas.openxmlformats.org/presentationml/2006/ole">
             <mc:AlternateContent xmlns:mc="http://schemas.openxmlformats.org/markup-compatibility/2006">
               <mc:Choice xmlns:v="urn:schemas-microsoft-com:vml" Requires="v">
-                <p:oleObj spid="_x0000_s1058" name="Equation" r:id="rId4" imgW="406400" imgH="419100" progId="Equation.DSMT4">
+                <p:oleObj spid="_x0000_s1063" name="Equation" r:id="rId4" imgW="406400" imgH="419100" progId="Equation.DSMT4">
                   <p:embed/>
                 </p:oleObj>
               </mc:Choice>
@@ -7210,7 +7210,7 @@
           <a:graphicData uri="http://schemas.openxmlformats.org/presentationml/2006/ole">
             <mc:AlternateContent xmlns:mc="http://schemas.openxmlformats.org/markup-compatibility/2006">
               <mc:Choice xmlns:v="urn:schemas-microsoft-com:vml" Requires="v">
-                <p:oleObj spid="_x0000_s2105" name="Equation" r:id="rId4" imgW="914400" imgH="198720" progId="Equation.DSMT4">
+                <p:oleObj spid="_x0000_s2113" name="Equation" r:id="rId4" imgW="914400" imgH="198720" progId="Equation.DSMT4">
                   <p:embed/>
                 </p:oleObj>
               </mc:Choice>
@@ -7280,7 +7280,7 @@
           <a:graphicData uri="http://schemas.openxmlformats.org/presentationml/2006/ole">
             <mc:AlternateContent xmlns:mc="http://schemas.openxmlformats.org/markup-compatibility/2006">
               <mc:Choice xmlns:v="urn:schemas-microsoft-com:vml" Requires="v">
-                <p:oleObj spid="_x0000_s2106" name="Equation" r:id="rId6" imgW="1854000" imgH="406080" progId="Equation.DSMT4">
+                <p:oleObj spid="_x0000_s2114" name="Equation" r:id="rId6" imgW="1854000" imgH="406080" progId="Equation.DSMT4">
                   <p:embed/>
                 </p:oleObj>
               </mc:Choice>
@@ -7689,7 +7689,7 @@
           <a:graphicData uri="http://schemas.openxmlformats.org/presentationml/2006/ole">
             <mc:AlternateContent xmlns:mc="http://schemas.openxmlformats.org/markup-compatibility/2006">
               <mc:Choice xmlns:v="urn:schemas-microsoft-com:vml" Requires="v">
-                <p:oleObj spid="_x0000_s3107" name="Equation" r:id="rId4" imgW="914400" imgH="198720" progId="Equation.DSMT4">
+                <p:oleObj spid="_x0000_s3112" name="Equation" r:id="rId4" imgW="914400" imgH="198720" progId="Equation.DSMT4">
                   <p:embed/>
                 </p:oleObj>
               </mc:Choice>
@@ -8037,7 +8037,7 @@
           <a:graphicData uri="http://schemas.openxmlformats.org/presentationml/2006/ole">
             <mc:AlternateContent xmlns:mc="http://schemas.openxmlformats.org/markup-compatibility/2006">
               <mc:Choice xmlns:v="urn:schemas-microsoft-com:vml" Requires="v">
-                <p:oleObj spid="_x0000_s4131" name="Equation" r:id="rId4" imgW="914400" imgH="198720" progId="Equation.DSMT4">
+                <p:oleObj spid="_x0000_s4136" name="Equation" r:id="rId4" imgW="914400" imgH="198720" progId="Equation.DSMT4">
                   <p:embed/>
                 </p:oleObj>
               </mc:Choice>
@@ -8981,7 +8981,7 @@
           <a:graphicData uri="http://schemas.openxmlformats.org/presentationml/2006/ole">
             <mc:AlternateContent xmlns:mc="http://schemas.openxmlformats.org/markup-compatibility/2006">
               <mc:Choice xmlns:v="urn:schemas-microsoft-com:vml" Requires="v">
-                <p:oleObj spid="_x0000_s5154" name="Equation" r:id="rId4" imgW="914400" imgH="198720" progId="Equation.DSMT4">
+                <p:oleObj spid="_x0000_s5159" name="Equation" r:id="rId4" imgW="914400" imgH="198720" progId="Equation.DSMT4">
                   <p:embed/>
                 </p:oleObj>
               </mc:Choice>
@@ -10443,7 +10443,7 @@
           <a:graphicData uri="http://schemas.openxmlformats.org/presentationml/2006/ole">
             <mc:AlternateContent xmlns:mc="http://schemas.openxmlformats.org/markup-compatibility/2006">
               <mc:Choice xmlns:v="urn:schemas-microsoft-com:vml" Requires="v">
-                <p:oleObj spid="_x0000_s7248" name="Equation" r:id="rId4" imgW="914400" imgH="198720" progId="Equation.DSMT4">
+                <p:oleObj spid="_x0000_s7259" name="Equation" r:id="rId4" imgW="914400" imgH="198720" progId="Equation.DSMT4">
                   <p:embed/>
                 </p:oleObj>
               </mc:Choice>
@@ -10566,20 +10566,20 @@
           <p:nvPr>
             <p:extLst>
               <p:ext uri="{D42A27DB-BD31-4B8C-83A1-F6EECF244321}">
-                <p14:modId xmlns:p14="http://schemas.microsoft.com/office/powerpoint/2010/main" val="2323453144"/>
+                <p14:modId xmlns:p14="http://schemas.microsoft.com/office/powerpoint/2010/main" val="432765986"/>
               </p:ext>
             </p:extLst>
           </p:nvPr>
         </p:nvGraphicFramePr>
         <p:xfrm>
-          <a:off x="4773612" y="3386138"/>
-          <a:ext cx="1592239" cy="2024062"/>
+          <a:off x="4773613" y="3386138"/>
+          <a:ext cx="1593850" cy="2024062"/>
         </p:xfrm>
         <a:graphic>
           <a:graphicData uri="http://schemas.openxmlformats.org/presentationml/2006/ole">
             <mc:AlternateContent xmlns:mc="http://schemas.openxmlformats.org/markup-compatibility/2006">
               <mc:Choice xmlns:v="urn:schemas-microsoft-com:vml" Requires="v">
-                <p:oleObj spid="_x0000_s7249" name="Equation" r:id="rId6" imgW="330200" imgH="419100" progId="Equation.DSMT4">
+                <p:oleObj spid="_x0000_s7260" name="Equation" r:id="rId6" imgW="330200" imgH="419100" progId="Equation.DSMT4">
                   <p:embed/>
                 </p:oleObj>
               </mc:Choice>
@@ -10603,8 +10603,8 @@
                     </p:blipFill>
                     <p:spPr bwMode="auto">
                       <a:xfrm>
-                        <a:off x="4773612" y="3386138"/>
-                        <a:ext cx="1592239" cy="2024062"/>
+                        <a:off x="4773613" y="3386138"/>
+                        <a:ext cx="1593850" cy="2024062"/>
                       </a:xfrm>
                       <a:prstGeom prst="rect">
                         <a:avLst/>
@@ -10635,7 +10635,7 @@
           <a:graphicData uri="http://schemas.openxmlformats.org/presentationml/2006/ole">
             <mc:AlternateContent xmlns:mc="http://schemas.openxmlformats.org/markup-compatibility/2006">
               <mc:Choice xmlns:v="urn:schemas-microsoft-com:vml" Requires="v">
-                <p:oleObj spid="_x0000_s7250" name="Equation" r:id="rId8" imgW="571320" imgH="457200" progId="Equation.DSMT4">
+                <p:oleObj spid="_x0000_s7261" name="Equation" r:id="rId8" imgW="571320" imgH="457200" progId="Equation.DSMT4">
                   <p:embed/>
                 </p:oleObj>
               </mc:Choice>

</xml_diff>